<commit_message>
w15: add new description
</commit_message>
<xml_diff>
--- a/w15/期末作業說明.pptx
+++ b/w15/期末作業說明.pptx
@@ -8,6 +8,7 @@
     <p:sldId id="256" r:id="rId2"/>
     <p:sldId id="271" r:id="rId3"/>
     <p:sldId id="272" r:id="rId4"/>
+    <p:sldId id="273" r:id="rId5"/>
   </p:sldIdLst>
   <p:sldSz cx="9144000" cy="6858000" type="screen4x3"/>
   <p:notesSz cx="6888163" cy="10020300"/>
@@ -3768,7 +3769,7 @@
     </p:spTree>
     <p:extLst>
       <p:ext uri="{BB962C8B-B14F-4D97-AF65-F5344CB8AC3E}">
-        <p14:creationId xmlns:p14="http://schemas.microsoft.com/office/powerpoint/2010/main" xmlns="" val="907554520"/>
+        <p14:creationId xmlns="" xmlns:p14="http://schemas.microsoft.com/office/powerpoint/2010/main" val="907554520"/>
       </p:ext>
     </p:extLst>
   </p:cSld>
@@ -3837,11 +3838,7 @@
           <a:p>
             <a:r>
               <a:rPr lang="zh-TW" altLang="en-US" dirty="0" smtClean="0"/>
-              <a:t>遊戲必要</a:t>
-            </a:r>
-            <a:r>
-              <a:rPr lang="zh-TW" altLang="en-US" dirty="0" smtClean="0"/>
-              <a:t>元素</a:t>
+              <a:t>遊戲必要元素</a:t>
             </a:r>
             <a:endParaRPr lang="en-US" altLang="zh-TW" dirty="0" smtClean="0"/>
           </a:p>
@@ -3884,11 +3881,7 @@
             <a:pPr lvl="1"/>
             <a:r>
               <a:rPr lang="zh-TW" altLang="en-US" dirty="0" smtClean="0"/>
-              <a:t>需要有</a:t>
-            </a:r>
-            <a:r>
-              <a:rPr lang="zh-TW" altLang="en-US" dirty="0" smtClean="0"/>
-              <a:t>配合你的遊戲題目的背景圖片</a:t>
+              <a:t>需要有配合你的遊戲題目的背景圖片</a:t>
             </a:r>
             <a:endParaRPr lang="en-US" altLang="zh-TW" dirty="0" smtClean="0"/>
           </a:p>
@@ -3955,7 +3948,7 @@
     </p:spTree>
     <p:extLst>
       <p:ext uri="{BB962C8B-B14F-4D97-AF65-F5344CB8AC3E}">
-        <p14:creationId xmlns:p14="http://schemas.microsoft.com/office/powerpoint/2010/main" xmlns="" val="3063263756"/>
+        <p14:creationId xmlns="" xmlns:p14="http://schemas.microsoft.com/office/powerpoint/2010/main" val="3063263756"/>
       </p:ext>
     </p:extLst>
   </p:cSld>
@@ -4024,11 +4017,7 @@
           <a:p>
             <a:r>
               <a:rPr lang="zh-TW" altLang="en-US" dirty="0" smtClean="0"/>
-              <a:t>遊戲必要</a:t>
-            </a:r>
-            <a:r>
-              <a:rPr lang="zh-TW" altLang="en-US" dirty="0" smtClean="0"/>
-              <a:t>元素</a:t>
+              <a:t>遊戲必要元素</a:t>
             </a:r>
             <a:endParaRPr lang="en-US" altLang="zh-TW" dirty="0" smtClean="0"/>
           </a:p>
@@ -4079,11 +4068,7 @@
             <a:pPr lvl="1"/>
             <a:r>
               <a:rPr lang="zh-TW" altLang="en-US" dirty="0" smtClean="0"/>
-              <a:t>需要有</a:t>
-            </a:r>
-            <a:r>
-              <a:rPr lang="zh-TW" altLang="en-US" dirty="0" smtClean="0"/>
-              <a:t>配合你的遊戲題目的背景圖片</a:t>
+              <a:t>需要有配合你的遊戲題目的背景圖片</a:t>
             </a:r>
             <a:endParaRPr lang="en-US" altLang="zh-TW" dirty="0" smtClean="0"/>
           </a:p>
@@ -4150,9 +4135,101 @@
     </p:spTree>
     <p:extLst>
       <p:ext uri="{BB962C8B-B14F-4D97-AF65-F5344CB8AC3E}">
-        <p14:creationId xmlns:p14="http://schemas.microsoft.com/office/powerpoint/2010/main" xmlns="" val="3063263756"/>
+        <p14:creationId xmlns="" xmlns:p14="http://schemas.microsoft.com/office/powerpoint/2010/main" val="3063263756"/>
       </p:ext>
     </p:extLst>
+  </p:cSld>
+  <p:clrMapOvr>
+    <a:masterClrMapping/>
+  </p:clrMapOvr>
+</p:sld>
+</file>
+
+<file path=ppt/slides/slide4.xml><?xml version="1.0" encoding="utf-8"?>
+<p:sld xmlns:a="http://schemas.openxmlformats.org/drawingml/2006/main" xmlns:r="http://schemas.openxmlformats.org/officeDocument/2006/relationships" xmlns:p="http://schemas.openxmlformats.org/presentationml/2006/main">
+  <p:cSld>
+    <p:spTree>
+      <p:nvGrpSpPr>
+        <p:cNvPr id="1" name=""/>
+        <p:cNvGrpSpPr/>
+        <p:nvPr/>
+      </p:nvGrpSpPr>
+      <p:grpSpPr>
+        <a:xfrm>
+          <a:off x="0" y="0"/>
+          <a:ext cx="0" cy="0"/>
+          <a:chOff x="0" y="0"/>
+          <a:chExt cx="0" cy="0"/>
+        </a:xfrm>
+      </p:grpSpPr>
+      <p:sp>
+        <p:nvSpPr>
+          <p:cNvPr id="2" name="標題 1"/>
+          <p:cNvSpPr>
+            <a:spLocks noGrp="1"/>
+          </p:cNvSpPr>
+          <p:nvPr>
+            <p:ph type="title"/>
+          </p:nvPr>
+        </p:nvSpPr>
+        <p:spPr/>
+        <p:txBody>
+          <a:bodyPr/>
+          <a:lstStyle/>
+          <a:p>
+            <a:r>
+              <a:rPr lang="zh-TW" altLang="en-US" dirty="0" smtClean="0"/>
+              <a:t>專題報告形式說明</a:t>
+            </a:r>
+            <a:endParaRPr lang="zh-TW" altLang="en-US" dirty="0"/>
+          </a:p>
+        </p:txBody>
+      </p:sp>
+      <p:sp>
+        <p:nvSpPr>
+          <p:cNvPr id="3" name="內容版面配置區 2"/>
+          <p:cNvSpPr>
+            <a:spLocks noGrp="1"/>
+          </p:cNvSpPr>
+          <p:nvPr>
+            <p:ph sz="quarter" idx="1"/>
+          </p:nvPr>
+        </p:nvSpPr>
+        <p:spPr/>
+        <p:txBody>
+          <a:bodyPr/>
+          <a:lstStyle/>
+          <a:p>
+            <a:r>
+              <a:rPr lang="zh-TW" altLang="en-US" dirty="0" smtClean="0"/>
+              <a:t>遊戲名稱</a:t>
+            </a:r>
+            <a:endParaRPr lang="en-US" altLang="zh-TW" dirty="0" smtClean="0"/>
+          </a:p>
+          <a:p>
+            <a:r>
+              <a:rPr lang="zh-TW" altLang="en-US" dirty="0" smtClean="0"/>
+              <a:t>遊戲規則</a:t>
+            </a:r>
+            <a:endParaRPr lang="en-US" altLang="zh-TW" dirty="0" smtClean="0"/>
+          </a:p>
+          <a:p>
+            <a:r>
+              <a:rPr lang="zh-TW" altLang="en-US" dirty="0" smtClean="0"/>
+              <a:t>遊戲動畫影片</a:t>
+            </a:r>
+            <a:endParaRPr lang="en-US" altLang="zh-TW" dirty="0" smtClean="0"/>
+          </a:p>
+          <a:p>
+            <a:r>
+              <a:rPr lang="zh-TW" altLang="en-US" dirty="0" smtClean="0"/>
+              <a:t>遊戲程式開發說明</a:t>
+            </a:r>
+            <a:endParaRPr lang="zh-TW" altLang="en-US" dirty="0"/>
+          </a:p>
+        </p:txBody>
+      </p:sp>
+    </p:spTree>
   </p:cSld>
   <p:clrMapOvr>
     <a:masterClrMapping/>

</xml_diff>